<commit_message>
update tagger, before debugging
</commit_message>
<xml_diff>
--- a/dnnQuery2.pptx
+++ b/dnnQuery2.pptx
@@ -517,139 +517,36 @@
           <a:bodyPr/>
           <a:lstStyle/>
           <a:p>
-            <a:r>
-              <a:rPr lang="en-US" dirty="0" smtClean="0"/>
-              <a:t>item: (-1, 0, +1,+3,+5,+10); (or using binary?)</a:t>
-            </a:r>
-          </a:p>
-          <a:p>
-            <a:r>
-              <a:rPr lang="en-US" dirty="0" smtClean="0"/>
-              <a:t>id: (1,2,3,</a:t>
-            </a:r>
-            <a:r>
-              <a:rPr lang="mr-IN" dirty="0" smtClean="0"/>
-              <a:t>…</a:t>
-            </a:r>
-            <a:r>
-              <a:rPr lang="en-US" dirty="0" smtClean="0"/>
-              <a:t>), </a:t>
-            </a:r>
+            <a:pPr marL="0" marR="0" indent="0" algn="l" defTabSz="914400" rtl="0" eaLnBrk="1" fontAlgn="auto" latinLnBrk="0" hangingPunct="1">
+              <a:lnSpc>
+                <a:spcPct val="100000"/>
+              </a:lnSpc>
+              <a:spcBef>
+                <a:spcPts val="0"/>
+              </a:spcBef>
+              <a:spcAft>
+                <a:spcPts val="0"/>
+              </a:spcAft>
+              <a:buClrTx/>
+              <a:buSzTx/>
+              <a:buFontTx/>
+              <a:buNone/>
+              <a:tabLst/>
+              <a:defRPr/>
+            </a:pPr>
             <a:r>
               <a:rPr lang="zh-CN" altLang="en-US" dirty="0" smtClean="0"/>
-              <a:t>按出现顺序编号，除非真的确定指同一个</a:t>
-            </a:r>
-            <a:r>
-              <a:rPr lang="en-US" dirty="0" smtClean="0"/>
-              <a:t>; </a:t>
-            </a:r>
-          </a:p>
-          <a:p>
-            <a:r>
-              <a:rPr lang="en-US" altLang="zh-CN" dirty="0" err="1" smtClean="0"/>
-              <a:t>field_template</a:t>
+              <a:t>后期</a:t>
             </a:r>
             <a:r>
               <a:rPr lang="en-US" altLang="zh-CN" dirty="0" smtClean="0"/>
-              <a:t>: </a:t>
-            </a:r>
-            <a:r>
-              <a:rPr lang="en-US" dirty="0" err="1" smtClean="0"/>
-              <a:t>nparray</a:t>
-            </a:r>
-            <a:r>
-              <a:rPr lang="en-US" dirty="0" smtClean="0"/>
-              <a:t>[]</a:t>
-            </a:r>
-            <a:r>
-              <a:rPr lang="en-US" dirty="0" smtClean="0"/>
-              <a:t> e.g.</a:t>
-            </a:r>
-            <a:r>
-              <a:rPr lang="en-US" dirty="0" smtClean="0"/>
-              <a:t>&lt;$People&gt;&lt;$Country&gt;; </a:t>
-            </a:r>
-          </a:p>
-          <a:p>
-            <a:r>
-              <a:rPr lang="en-US" dirty="0" smtClean="0"/>
-              <a:t>value type: </a:t>
+              <a:t>adding</a:t>
             </a:r>
             <a:r>
               <a:rPr lang="zh-CN" altLang="en-US" dirty="0" smtClean="0"/>
-              <a:t>只有</a:t>
-            </a:r>
-            <a:r>
-              <a:rPr lang="en-US" altLang="zh-CN" dirty="0" smtClean="0"/>
-              <a:t>f/v</a:t>
-            </a:r>
-            <a:r>
-              <a:rPr lang="zh-CN" altLang="en-US" dirty="0" smtClean="0"/>
-              <a:t>非零；</a:t>
-            </a:r>
-            <a:r>
-              <a:rPr lang="en-US" altLang="zh-CN" dirty="0" smtClean="0"/>
-              <a:t>binary</a:t>
-            </a:r>
-            <a:r>
-              <a:rPr lang="zh-CN" altLang="en-US" dirty="0" smtClean="0"/>
-              <a:t>表示</a:t>
-            </a:r>
-            <a:r>
-              <a:rPr lang="en-US" dirty="0" smtClean="0"/>
-              <a:t>([0,0,1,0], [1,0,0,0],</a:t>
-            </a:r>
-            <a:r>
-              <a:rPr lang="mr-IN" dirty="0" smtClean="0"/>
-              <a:t>…</a:t>
-            </a:r>
-            <a:r>
-              <a:rPr lang="en-US" dirty="0" smtClean="0"/>
-              <a:t>) </a:t>
-            </a:r>
-            <a:r>
-              <a:rPr lang="en-US" altLang="zh-CN" dirty="0" smtClean="0"/>
-              <a:t>[</a:t>
-            </a:r>
-            <a:r>
-              <a:rPr lang="en-US" altLang="zh-CN" dirty="0" err="1" smtClean="0"/>
-              <a:t>int</a:t>
-            </a:r>
-            <a:r>
-              <a:rPr lang="en-US" altLang="zh-CN" dirty="0" smtClean="0"/>
-              <a:t>, double,</a:t>
-            </a:r>
-            <a:r>
-              <a:rPr lang="en-US" altLang="zh-CN" baseline="0" dirty="0" smtClean="0"/>
-              <a:t> string, ordinal, category</a:t>
-            </a:r>
-            <a:r>
-              <a:rPr lang="en-US" altLang="zh-CN" dirty="0" smtClean="0"/>
-              <a:t>]</a:t>
-            </a:r>
-            <a:r>
-              <a:rPr lang="en-US" dirty="0" smtClean="0"/>
-              <a:t>; </a:t>
-            </a:r>
-          </a:p>
-          <a:p>
-            <a:r>
-              <a:rPr lang="en-US" dirty="0" err="1" smtClean="0"/>
-              <a:t>value_embed</a:t>
-            </a:r>
-            <a:r>
-              <a:rPr lang="en-US" dirty="0" smtClean="0"/>
-              <a:t>: </a:t>
-            </a:r>
-            <a:r>
-              <a:rPr lang="en-US" dirty="0" err="1" smtClean="0"/>
-              <a:t>nparray</a:t>
-            </a:r>
-            <a:r>
-              <a:rPr lang="en-US" dirty="0" smtClean="0"/>
-              <a:t>[] e.g.</a:t>
-            </a:r>
-            <a:endParaRPr lang="en-US" dirty="0"/>
+              <a:t>新的</a:t>
+            </a:r>
+            <a:endParaRPr lang="en-US" dirty="0" smtClean="0"/>
           </a:p>
         </p:txBody>
       </p:sp>
@@ -775,15 +672,7 @@
             </a:r>
             <a:r>
               <a:rPr lang="en-US" dirty="0" smtClean="0"/>
-              <a:t>[]</a:t>
-            </a:r>
-            <a:r>
-              <a:rPr lang="en-US" dirty="0" smtClean="0"/>
-              <a:t> e.g.</a:t>
-            </a:r>
-            <a:r>
-              <a:rPr lang="en-US" dirty="0" smtClean="0"/>
-              <a:t>&lt;$People&gt;&lt;$Country&gt;; </a:t>
+              <a:t>[] e.g.&lt;$People&gt;&lt;$Country&gt;; </a:t>
             </a:r>
           </a:p>
           <a:p>
@@ -862,10 +751,9 @@
               <a:t>nparray</a:t>
             </a:r>
             <a:r>
-              <a:rPr lang="en-US" dirty="0" smtClean="0"/>
+              <a:rPr lang="en-US" smtClean="0"/>
               <a:t>[] e.g.</a:t>
             </a:r>
-            <a:endParaRPr lang="en-US" dirty="0"/>
           </a:p>
         </p:txBody>
       </p:sp>
@@ -7223,7 +7111,7 @@
           <p:nvPr>
             <p:extLst>
               <p:ext uri="{D42A27DB-BD31-4B8C-83A1-F6EECF244321}">
-                <p14:modId xmlns:p14="http://schemas.microsoft.com/office/powerpoint/2010/main" val="713791547"/>
+                <p14:modId xmlns:p14="http://schemas.microsoft.com/office/powerpoint/2010/main" val="941699304"/>
               </p:ext>
             </p:extLst>
           </p:nvPr>
@@ -7548,10 +7436,24 @@
                     <a:lstStyle/>
                     <a:p>
                       <a:r>
-                        <a:rPr lang="en-US" dirty="0" smtClean="0"/>
+                        <a:rPr lang="en-US" dirty="0" smtClean="0">
+                          <a:solidFill>
+                            <a:schemeClr val="tx2">
+                              <a:lumMod val="20000"/>
+                              <a:lumOff val="80000"/>
+                            </a:schemeClr>
+                          </a:solidFill>
+                        </a:rPr>
                         <a:t>&lt;comp&gt;</a:t>
                       </a:r>
-                      <a:endParaRPr lang="en-US" dirty="0"/>
+                      <a:endParaRPr lang="en-US" dirty="0">
+                        <a:solidFill>
+                          <a:schemeClr val="tx2">
+                            <a:lumMod val="20000"/>
+                            <a:lumOff val="80000"/>
+                          </a:schemeClr>
+                        </a:solidFill>
+                      </a:endParaRPr>
                     </a:p>
                   </a:txBody>
                   <a:tcPr/>
@@ -7562,18 +7464,46 @@
                     <a:lstStyle/>
                     <a:p>
                       <a:r>
-                        <a:rPr lang="en-US" dirty="0" smtClean="0"/>
+                        <a:rPr lang="en-US" dirty="0" smtClean="0">
+                          <a:solidFill>
+                            <a:schemeClr val="tx2">
+                              <a:lumMod val="20000"/>
+                              <a:lumOff val="80000"/>
+                            </a:schemeClr>
+                          </a:solidFill>
+                        </a:rPr>
                         <a:t>&lt;</a:t>
                       </a:r>
                       <a:r>
-                        <a:rPr lang="en-US" dirty="0" err="1" smtClean="0"/>
+                        <a:rPr lang="en-US" dirty="0" err="1" smtClean="0">
+                          <a:solidFill>
+                            <a:schemeClr val="tx2">
+                              <a:lumMod val="20000"/>
+                              <a:lumOff val="80000"/>
+                            </a:schemeClr>
+                          </a:solidFill>
+                        </a:rPr>
                         <a:t>comp:eq</a:t>
                       </a:r>
                       <a:r>
-                        <a:rPr lang="en-US" dirty="0" smtClean="0"/>
+                        <a:rPr lang="en-US" dirty="0" smtClean="0">
+                          <a:solidFill>
+                            <a:schemeClr val="tx2">
+                              <a:lumMod val="20000"/>
+                              <a:lumOff val="80000"/>
+                            </a:schemeClr>
+                          </a:solidFill>
+                        </a:rPr>
                         <a:t>, g, l&gt;</a:t>
                       </a:r>
-                      <a:endParaRPr lang="en-US" dirty="0"/>
+                      <a:endParaRPr lang="en-US" dirty="0">
+                        <a:solidFill>
+                          <a:schemeClr val="tx2">
+                            <a:lumMod val="20000"/>
+                            <a:lumOff val="80000"/>
+                          </a:schemeClr>
+                        </a:solidFill>
+                      </a:endParaRPr>
                     </a:p>
                   </a:txBody>
                   <a:tcPr/>
@@ -7584,10 +7514,24 @@
                     <a:lstStyle/>
                     <a:p>
                       <a:r>
-                        <a:rPr lang="en-US" dirty="0" smtClean="0"/>
+                        <a:rPr lang="en-US" dirty="0" smtClean="0">
+                          <a:solidFill>
+                            <a:schemeClr val="tx2">
+                              <a:lumMod val="20000"/>
+                              <a:lumOff val="80000"/>
+                            </a:schemeClr>
+                          </a:solidFill>
+                        </a:rPr>
                         <a:t>0</a:t>
                       </a:r>
-                      <a:endParaRPr lang="en-US" dirty="0"/>
+                      <a:endParaRPr lang="en-US" dirty="0">
+                        <a:solidFill>
+                          <a:schemeClr val="tx2">
+                            <a:lumMod val="20000"/>
+                            <a:lumOff val="80000"/>
+                          </a:schemeClr>
+                        </a:solidFill>
+                      </a:endParaRPr>
                     </a:p>
                   </a:txBody>
                   <a:tcPr/>
@@ -7598,10 +7542,46 @@
                     <a:lstStyle/>
                     <a:p>
                       <a:r>
-                        <a:rPr lang="en-US" dirty="0" smtClean="0"/>
-                        <a:t>embed</a:t>
+                        <a:rPr lang="en-US" dirty="0" smtClean="0">
+                          <a:solidFill>
+                            <a:schemeClr val="tx2">
+                              <a:lumMod val="20000"/>
+                              <a:lumOff val="80000"/>
+                            </a:schemeClr>
+                          </a:solidFill>
+                        </a:rPr>
+                        <a:t>embed/[0, 0, </a:t>
                       </a:r>
-                      <a:endParaRPr lang="en-US" dirty="0"/>
+                      <a:r>
+                        <a:rPr lang="mr-IN" dirty="0" smtClean="0">
+                          <a:solidFill>
+                            <a:schemeClr val="tx2">
+                              <a:lumMod val="20000"/>
+                              <a:lumOff val="80000"/>
+                            </a:schemeClr>
+                          </a:solidFill>
+                        </a:rPr>
+                        <a:t>…</a:t>
+                      </a:r>
+                      <a:r>
+                        <a:rPr lang="en-US" dirty="0" smtClean="0">
+                          <a:solidFill>
+                            <a:schemeClr val="tx2">
+                              <a:lumMod val="20000"/>
+                              <a:lumOff val="80000"/>
+                            </a:schemeClr>
+                          </a:solidFill>
+                        </a:rPr>
+                        <a:t>, 0]</a:t>
+                      </a:r>
+                      <a:endParaRPr lang="en-US" dirty="0">
+                        <a:solidFill>
+                          <a:schemeClr val="tx2">
+                            <a:lumMod val="20000"/>
+                            <a:lumOff val="80000"/>
+                          </a:schemeClr>
+                        </a:solidFill>
+                      </a:endParaRPr>
                     </a:p>
                   </a:txBody>
                   <a:tcPr/>
@@ -7629,7 +7609,14 @@
                         <a:defRPr/>
                       </a:pPr>
                       <a:r>
-                        <a:rPr lang="en-US" dirty="0" smtClean="0"/>
+                        <a:rPr lang="en-US" dirty="0" smtClean="0">
+                          <a:solidFill>
+                            <a:schemeClr val="tx2">
+                              <a:lumMod val="20000"/>
+                              <a:lumOff val="80000"/>
+                            </a:schemeClr>
+                          </a:solidFill>
+                        </a:rPr>
                         <a:t>[0, 0, 0, 0, 0]</a:t>
                       </a:r>
                     </a:p>
@@ -7644,18 +7631,46 @@
                     <a:lstStyle/>
                     <a:p>
                       <a:r>
-                        <a:rPr lang="en-US" dirty="0" smtClean="0"/>
+                        <a:rPr lang="en-US" dirty="0" smtClean="0">
+                          <a:solidFill>
+                            <a:schemeClr val="tx2">
+                              <a:lumMod val="20000"/>
+                              <a:lumOff val="80000"/>
+                            </a:schemeClr>
+                          </a:solidFill>
+                        </a:rPr>
                         <a:t>&lt;</a:t>
                       </a:r>
                       <a:r>
-                        <a:rPr lang="en-US" dirty="0" err="1" smtClean="0"/>
+                        <a:rPr lang="en-US" dirty="0" err="1" smtClean="0">
+                          <a:solidFill>
+                            <a:schemeClr val="tx2">
+                              <a:lumMod val="20000"/>
+                              <a:lumOff val="80000"/>
+                            </a:schemeClr>
+                          </a:solidFill>
+                        </a:rPr>
                         <a:t>calc</a:t>
                       </a:r>
                       <a:r>
-                        <a:rPr lang="en-US" dirty="0" smtClean="0"/>
+                        <a:rPr lang="en-US" dirty="0" smtClean="0">
+                          <a:solidFill>
+                            <a:schemeClr val="tx2">
+                              <a:lumMod val="20000"/>
+                              <a:lumOff val="80000"/>
+                            </a:schemeClr>
+                          </a:solidFill>
+                        </a:rPr>
                         <a:t>&gt;</a:t>
                       </a:r>
-                      <a:endParaRPr lang="en-US" dirty="0"/>
+                      <a:endParaRPr lang="en-US" dirty="0">
+                        <a:solidFill>
+                          <a:schemeClr val="tx2">
+                            <a:lumMod val="20000"/>
+                            <a:lumOff val="80000"/>
+                          </a:schemeClr>
+                        </a:solidFill>
+                      </a:endParaRPr>
                     </a:p>
                   </a:txBody>
                   <a:tcPr/>
@@ -7666,18 +7681,46 @@
                     <a:lstStyle/>
                     <a:p>
                       <a:r>
-                        <a:rPr lang="en-US" dirty="0" smtClean="0"/>
+                        <a:rPr lang="en-US" dirty="0" smtClean="0">
+                          <a:solidFill>
+                            <a:schemeClr val="tx2">
+                              <a:lumMod val="20000"/>
+                              <a:lumOff val="80000"/>
+                            </a:schemeClr>
+                          </a:solidFill>
+                        </a:rPr>
                         <a:t>&lt;</a:t>
                       </a:r>
                       <a:r>
-                        <a:rPr lang="en-US" dirty="0" err="1" smtClean="0"/>
+                        <a:rPr lang="en-US" dirty="0" err="1" smtClean="0">
+                          <a:solidFill>
+                            <a:schemeClr val="tx2">
+                              <a:lumMod val="20000"/>
+                              <a:lumOff val="80000"/>
+                            </a:schemeClr>
+                          </a:solidFill>
+                        </a:rPr>
                         <a:t>calc</a:t>
                       </a:r>
                       <a:r>
-                        <a:rPr lang="en-US" dirty="0" smtClean="0"/>
+                        <a:rPr lang="en-US" dirty="0" smtClean="0">
+                          <a:solidFill>
+                            <a:schemeClr val="tx2">
+                              <a:lumMod val="20000"/>
+                              <a:lumOff val="80000"/>
+                            </a:schemeClr>
+                          </a:solidFill>
+                        </a:rPr>
                         <a:t>: sum, diff, mean&gt;</a:t>
                       </a:r>
-                      <a:endParaRPr lang="en-US" dirty="0"/>
+                      <a:endParaRPr lang="en-US" dirty="0">
+                        <a:solidFill>
+                          <a:schemeClr val="tx2">
+                            <a:lumMod val="20000"/>
+                            <a:lumOff val="80000"/>
+                          </a:schemeClr>
+                        </a:solidFill>
+                      </a:endParaRPr>
                     </a:p>
                   </a:txBody>
                   <a:tcPr/>
@@ -7688,10 +7731,24 @@
                     <a:lstStyle/>
                     <a:p>
                       <a:r>
-                        <a:rPr lang="en-US" dirty="0" smtClean="0"/>
+                        <a:rPr lang="en-US" dirty="0" smtClean="0">
+                          <a:solidFill>
+                            <a:schemeClr val="tx2">
+                              <a:lumMod val="20000"/>
+                              <a:lumOff val="80000"/>
+                            </a:schemeClr>
+                          </a:solidFill>
+                        </a:rPr>
                         <a:t>0</a:t>
                       </a:r>
-                      <a:endParaRPr lang="en-US" dirty="0"/>
+                      <a:endParaRPr lang="en-US" dirty="0">
+                        <a:solidFill>
+                          <a:schemeClr val="tx2">
+                            <a:lumMod val="20000"/>
+                            <a:lumOff val="80000"/>
+                          </a:schemeClr>
+                        </a:solidFill>
+                      </a:endParaRPr>
                     </a:p>
                   </a:txBody>
                   <a:tcPr/>
@@ -7702,10 +7759,24 @@
                     <a:lstStyle/>
                     <a:p>
                       <a:r>
-                        <a:rPr lang="en-US" dirty="0" smtClean="0"/>
+                        <a:rPr lang="en-US" dirty="0" smtClean="0">
+                          <a:solidFill>
+                            <a:schemeClr val="tx2">
+                              <a:lumMod val="20000"/>
+                              <a:lumOff val="80000"/>
+                            </a:schemeClr>
+                          </a:solidFill>
+                        </a:rPr>
                         <a:t>embed</a:t>
                       </a:r>
-                      <a:endParaRPr lang="en-US" dirty="0"/>
+                      <a:endParaRPr lang="en-US" dirty="0">
+                        <a:solidFill>
+                          <a:schemeClr val="tx2">
+                            <a:lumMod val="20000"/>
+                            <a:lumOff val="80000"/>
+                          </a:schemeClr>
+                        </a:solidFill>
+                      </a:endParaRPr>
                     </a:p>
                   </a:txBody>
                   <a:tcPr/>
@@ -7733,7 +7804,14 @@
                         <a:defRPr/>
                       </a:pPr>
                       <a:r>
-                        <a:rPr lang="en-US" dirty="0" smtClean="0"/>
+                        <a:rPr lang="en-US" dirty="0" smtClean="0">
+                          <a:solidFill>
+                            <a:schemeClr val="tx2">
+                              <a:lumMod val="20000"/>
+                              <a:lumOff val="80000"/>
+                            </a:schemeClr>
+                          </a:solidFill>
+                        </a:rPr>
                         <a:t>[0, 0, 0, 0, 0]</a:t>
                       </a:r>
                     </a:p>
@@ -7748,18 +7826,46 @@
                     <a:lstStyle/>
                     <a:p>
                       <a:r>
-                        <a:rPr lang="en-US" dirty="0" smtClean="0"/>
+                        <a:rPr lang="en-US" dirty="0" smtClean="0">
+                          <a:solidFill>
+                            <a:schemeClr val="tx2">
+                              <a:lumMod val="20000"/>
+                              <a:lumOff val="80000"/>
+                            </a:schemeClr>
+                          </a:solidFill>
+                        </a:rPr>
                         <a:t>&lt;</a:t>
                       </a:r>
                       <a:r>
-                        <a:rPr lang="en-US" dirty="0" err="1" smtClean="0"/>
+                        <a:rPr lang="en-US" dirty="0" err="1" smtClean="0">
+                          <a:solidFill>
+                            <a:schemeClr val="tx2">
+                              <a:lumMod val="20000"/>
+                              <a:lumOff val="80000"/>
+                            </a:schemeClr>
+                          </a:solidFill>
+                        </a:rPr>
                         <a:t>arg</a:t>
                       </a:r>
                       <a:r>
-                        <a:rPr lang="en-US" dirty="0" smtClean="0"/>
+                        <a:rPr lang="en-US" dirty="0" smtClean="0">
+                          <a:solidFill>
+                            <a:schemeClr val="tx2">
+                              <a:lumMod val="20000"/>
+                              <a:lumOff val="80000"/>
+                            </a:schemeClr>
+                          </a:solidFill>
+                        </a:rPr>
                         <a:t>&gt;</a:t>
                       </a:r>
-                      <a:endParaRPr lang="en-US" dirty="0"/>
+                      <a:endParaRPr lang="en-US" dirty="0">
+                        <a:solidFill>
+                          <a:schemeClr val="tx2">
+                            <a:lumMod val="20000"/>
+                            <a:lumOff val="80000"/>
+                          </a:schemeClr>
+                        </a:solidFill>
+                      </a:endParaRPr>
                     </a:p>
                   </a:txBody>
                   <a:tcPr/>
@@ -7770,18 +7876,46 @@
                     <a:lstStyle/>
                     <a:p>
                       <a:r>
-                        <a:rPr lang="en-US" dirty="0" smtClean="0"/>
+                        <a:rPr lang="en-US" dirty="0" smtClean="0">
+                          <a:solidFill>
+                            <a:schemeClr val="tx2">
+                              <a:lumMod val="20000"/>
+                              <a:lumOff val="80000"/>
+                            </a:schemeClr>
+                          </a:solidFill>
+                        </a:rPr>
                         <a:t>&lt;</a:t>
                       </a:r>
                       <a:r>
-                        <a:rPr lang="en-US" dirty="0" err="1" smtClean="0"/>
+                        <a:rPr lang="en-US" dirty="0" err="1" smtClean="0">
+                          <a:solidFill>
+                            <a:schemeClr val="tx2">
+                              <a:lumMod val="20000"/>
+                              <a:lumOff val="80000"/>
+                            </a:schemeClr>
+                          </a:solidFill>
+                        </a:rPr>
                         <a:t>arg</a:t>
                       </a:r>
                       <a:r>
-                        <a:rPr lang="en-US" dirty="0" smtClean="0"/>
+                        <a:rPr lang="en-US" dirty="0" smtClean="0">
+                          <a:solidFill>
+                            <a:schemeClr val="tx2">
+                              <a:lumMod val="20000"/>
+                              <a:lumOff val="80000"/>
+                            </a:schemeClr>
+                          </a:solidFill>
+                        </a:rPr>
                         <a:t>: max, min&gt;</a:t>
                       </a:r>
-                      <a:endParaRPr lang="en-US" dirty="0"/>
+                      <a:endParaRPr lang="en-US" dirty="0">
+                        <a:solidFill>
+                          <a:schemeClr val="tx2">
+                            <a:lumMod val="20000"/>
+                            <a:lumOff val="80000"/>
+                          </a:schemeClr>
+                        </a:solidFill>
+                      </a:endParaRPr>
                     </a:p>
                   </a:txBody>
                   <a:tcPr/>
@@ -7792,10 +7926,24 @@
                     <a:lstStyle/>
                     <a:p>
                       <a:r>
-                        <a:rPr lang="en-US" dirty="0" smtClean="0"/>
+                        <a:rPr lang="en-US" dirty="0" smtClean="0">
+                          <a:solidFill>
+                            <a:schemeClr val="tx2">
+                              <a:lumMod val="20000"/>
+                              <a:lumOff val="80000"/>
+                            </a:schemeClr>
+                          </a:solidFill>
+                        </a:rPr>
                         <a:t>0</a:t>
                       </a:r>
-                      <a:endParaRPr lang="en-US" dirty="0"/>
+                      <a:endParaRPr lang="en-US" dirty="0">
+                        <a:solidFill>
+                          <a:schemeClr val="tx2">
+                            <a:lumMod val="20000"/>
+                            <a:lumOff val="80000"/>
+                          </a:schemeClr>
+                        </a:solidFill>
+                      </a:endParaRPr>
                     </a:p>
                   </a:txBody>
                   <a:tcPr/>
@@ -7806,10 +7954,24 @@
                     <a:lstStyle/>
                     <a:p>
                       <a:r>
-                        <a:rPr lang="en-US" dirty="0" smtClean="0"/>
+                        <a:rPr lang="en-US" dirty="0" smtClean="0">
+                          <a:solidFill>
+                            <a:schemeClr val="tx2">
+                              <a:lumMod val="20000"/>
+                              <a:lumOff val="80000"/>
+                            </a:schemeClr>
+                          </a:solidFill>
+                        </a:rPr>
                         <a:t>embed</a:t>
                       </a:r>
-                      <a:endParaRPr lang="en-US" dirty="0"/>
+                      <a:endParaRPr lang="en-US" dirty="0">
+                        <a:solidFill>
+                          <a:schemeClr val="tx2">
+                            <a:lumMod val="20000"/>
+                            <a:lumOff val="80000"/>
+                          </a:schemeClr>
+                        </a:solidFill>
+                      </a:endParaRPr>
                     </a:p>
                   </a:txBody>
                   <a:tcPr/>
@@ -7837,7 +7999,14 @@
                         <a:defRPr/>
                       </a:pPr>
                       <a:r>
-                        <a:rPr lang="en-US" dirty="0" smtClean="0"/>
+                        <a:rPr lang="en-US" dirty="0" smtClean="0">
+                          <a:solidFill>
+                            <a:schemeClr val="tx2">
+                              <a:lumMod val="20000"/>
+                              <a:lumOff val="80000"/>
+                            </a:schemeClr>
+                          </a:solidFill>
+                        </a:rPr>
                         <a:t>[0, 0, 0, 0, 0]</a:t>
                       </a:r>
                     </a:p>
@@ -7852,10 +8021,24 @@
                     <a:lstStyle/>
                     <a:p>
                       <a:r>
-                        <a:rPr lang="en-US" dirty="0" smtClean="0"/>
+                        <a:rPr lang="en-US" dirty="0" smtClean="0">
+                          <a:solidFill>
+                            <a:schemeClr val="tx2">
+                              <a:lumMod val="20000"/>
+                              <a:lumOff val="80000"/>
+                            </a:schemeClr>
+                          </a:solidFill>
+                        </a:rPr>
                         <a:t>&lt;op&gt;</a:t>
                       </a:r>
-                      <a:endParaRPr lang="en-US" dirty="0"/>
+                      <a:endParaRPr lang="en-US" dirty="0">
+                        <a:solidFill>
+                          <a:schemeClr val="tx2">
+                            <a:lumMod val="20000"/>
+                            <a:lumOff val="80000"/>
+                          </a:schemeClr>
+                        </a:solidFill>
+                      </a:endParaRPr>
                     </a:p>
                   </a:txBody>
                   <a:tcPr/>
@@ -7866,10 +8049,24 @@
                     <a:lstStyle/>
                     <a:p>
                       <a:r>
-                        <a:rPr lang="en-US" dirty="0" smtClean="0"/>
+                        <a:rPr lang="en-US" dirty="0" smtClean="0">
+                          <a:solidFill>
+                            <a:schemeClr val="tx2">
+                              <a:lumMod val="20000"/>
+                              <a:lumOff val="80000"/>
+                            </a:schemeClr>
+                          </a:solidFill>
+                        </a:rPr>
                         <a:t>TBD</a:t>
                       </a:r>
-                      <a:endParaRPr lang="en-US" dirty="0"/>
+                      <a:endParaRPr lang="en-US" dirty="0">
+                        <a:solidFill>
+                          <a:schemeClr val="tx2">
+                            <a:lumMod val="20000"/>
+                            <a:lumOff val="80000"/>
+                          </a:schemeClr>
+                        </a:solidFill>
+                      </a:endParaRPr>
                     </a:p>
                   </a:txBody>
                   <a:tcPr/>
@@ -7880,10 +8077,24 @@
                     <a:lstStyle/>
                     <a:p>
                       <a:r>
-                        <a:rPr lang="en-US" dirty="0" smtClean="0"/>
+                        <a:rPr lang="en-US" dirty="0" smtClean="0">
+                          <a:solidFill>
+                            <a:schemeClr val="tx2">
+                              <a:lumMod val="20000"/>
+                              <a:lumOff val="80000"/>
+                            </a:schemeClr>
+                          </a:solidFill>
+                        </a:rPr>
                         <a:t>0</a:t>
                       </a:r>
-                      <a:endParaRPr lang="en-US" dirty="0"/>
+                      <a:endParaRPr lang="en-US" dirty="0">
+                        <a:solidFill>
+                          <a:schemeClr val="tx2">
+                            <a:lumMod val="20000"/>
+                            <a:lumOff val="80000"/>
+                          </a:schemeClr>
+                        </a:solidFill>
+                      </a:endParaRPr>
                     </a:p>
                   </a:txBody>
                   <a:tcPr/>
@@ -7894,10 +8105,24 @@
                     <a:lstStyle/>
                     <a:p>
                       <a:r>
-                        <a:rPr lang="en-US" dirty="0" smtClean="0"/>
+                        <a:rPr lang="en-US" dirty="0" smtClean="0">
+                          <a:solidFill>
+                            <a:schemeClr val="tx2">
+                              <a:lumMod val="20000"/>
+                              <a:lumOff val="80000"/>
+                            </a:schemeClr>
+                          </a:solidFill>
+                        </a:rPr>
                         <a:t>embed</a:t>
                       </a:r>
-                      <a:endParaRPr lang="en-US" dirty="0"/>
+                      <a:endParaRPr lang="en-US" dirty="0">
+                        <a:solidFill>
+                          <a:schemeClr val="tx2">
+                            <a:lumMod val="20000"/>
+                            <a:lumOff val="80000"/>
+                          </a:schemeClr>
+                        </a:solidFill>
+                      </a:endParaRPr>
                     </a:p>
                   </a:txBody>
                   <a:tcPr/>
@@ -7925,7 +8150,14 @@
                         <a:defRPr/>
                       </a:pPr>
                       <a:r>
-                        <a:rPr lang="en-US" dirty="0" smtClean="0"/>
+                        <a:rPr lang="en-US" dirty="0" smtClean="0">
+                          <a:solidFill>
+                            <a:schemeClr val="tx2">
+                              <a:lumMod val="20000"/>
+                              <a:lumOff val="80000"/>
+                            </a:schemeClr>
+                          </a:solidFill>
+                        </a:rPr>
                         <a:t>[0, 0, 0, 0, 0]</a:t>
                       </a:r>
                     </a:p>

</xml_diff>

<commit_message>
Milestone 2.0 Tagger and Grammar
tagger complete and new grammar 3.0 works well
</commit_message>
<xml_diff>
--- a/dnnQuery2.pptx
+++ b/dnnQuery2.pptx
@@ -6171,30 +6171,6 @@
           <a:chExt cx="0" cy="0"/>
         </a:xfrm>
       </p:grpSpPr>
-      <p:pic>
-        <p:nvPicPr>
-          <p:cNvPr id="2" name="Picture 1"/>
-          <p:cNvPicPr>
-            <a:picLocks noChangeAspect="1"/>
-          </p:cNvPicPr>
-          <p:nvPr/>
-        </p:nvPicPr>
-        <p:blipFill>
-          <a:blip r:embed="rId2"/>
-          <a:stretch>
-            <a:fillRect/>
-          </a:stretch>
-        </p:blipFill>
-        <p:spPr>
-          <a:xfrm>
-            <a:off x="882650" y="1669366"/>
-            <a:ext cx="10502900" cy="3937000"/>
-          </a:xfrm>
-          <a:prstGeom prst="rect">
-            <a:avLst/>
-          </a:prstGeom>
-        </p:spPr>
-      </p:pic>
       <p:sp>
         <p:nvSpPr>
           <p:cNvPr id="3" name="Rectangle 2"/>
@@ -6217,16 +6193,93 @@
           <a:lstStyle/>
           <a:p>
             <a:r>
+              <a:rPr lang="en-US" dirty="0" smtClean="0"/>
+              <a:t>Input: for </a:t>
+            </a:r>
+            <a:r>
+              <a:rPr lang="en-US"/>
+              <a:t>&lt;</a:t>
+            </a:r>
+            <a:r>
               <a:rPr lang="en-US" smtClean="0"/>
-              <a:t>Input: for </a:t>
+              <a:t>field:0&gt; </a:t>
             </a:r>
             <a:r>
               <a:rPr lang="en-US" dirty="0"/>
-              <a:t>&lt;field&gt; with more than &lt;value&gt; &lt;field&gt; and &lt;field&gt; less than &lt;value&gt;, &lt;field&gt; has the most &lt;field&gt;</a:t>
-            </a:r>
+              <a:t>with more than </a:t>
+            </a:r>
+            <a:r>
+              <a:rPr lang="en-US" dirty="0" smtClean="0"/>
+              <a:t>400 </a:t>
+            </a:r>
+            <a:r>
+              <a:rPr lang="en-US" smtClean="0"/>
+              <a:t>&lt;field:1&gt; </a:t>
+            </a:r>
+            <a:r>
+              <a:rPr lang="en-US" dirty="0"/>
+              <a:t>and </a:t>
+            </a:r>
+            <a:r>
+              <a:rPr lang="en-US"/>
+              <a:t>&lt;</a:t>
+            </a:r>
+            <a:r>
+              <a:rPr lang="en-US" smtClean="0"/>
+              <a:t>field:2&gt; </a:t>
+            </a:r>
+            <a:r>
+              <a:rPr lang="en-US" dirty="0"/>
+              <a:t>less </a:t>
+            </a:r>
+            <a:r>
+              <a:rPr lang="en-US"/>
+              <a:t>than </a:t>
+            </a:r>
+            <a:r>
+              <a:rPr lang="en-US" smtClean="0"/>
+              <a:t>14 , &lt;field:0&gt; </a:t>
+            </a:r>
+            <a:r>
+              <a:rPr lang="en-US" dirty="0"/>
+              <a:t>has the most </a:t>
+            </a:r>
+            <a:r>
+              <a:rPr lang="en-US"/>
+              <a:t>&lt;</a:t>
+            </a:r>
+            <a:r>
+              <a:rPr lang="en-US" smtClean="0"/>
+              <a:t>field:3&gt;</a:t>
+            </a:r>
+            <a:endParaRPr lang="en-US" dirty="0"/>
           </a:p>
         </p:txBody>
       </p:sp>
+      <p:pic>
+        <p:nvPicPr>
+          <p:cNvPr id="4" name="Picture 3"/>
+          <p:cNvPicPr>
+            <a:picLocks noChangeAspect="1"/>
+          </p:cNvPicPr>
+          <p:nvPr/>
+        </p:nvPicPr>
+        <p:blipFill>
+          <a:blip r:embed="rId2"/>
+          <a:stretch>
+            <a:fillRect/>
+          </a:stretch>
+        </p:blipFill>
+        <p:spPr>
+          <a:xfrm>
+            <a:off x="869950" y="1708150"/>
+            <a:ext cx="10452100" cy="3441700"/>
+          </a:xfrm>
+          <a:prstGeom prst="rect">
+            <a:avLst/>
+          </a:prstGeom>
+        </p:spPr>
+      </p:pic>
     </p:spTree>
     <p:extLst>
       <p:ext uri="{BB962C8B-B14F-4D97-AF65-F5344CB8AC3E}">

</xml_diff>